<commit_message>
Update team names: Anh Bui, Cuong Nguyen, Minh Nguyen
</commit_message>
<xml_diff>
--- a/NAPE_Final_Presentation.pptx
+++ b/NAPE_Final_Presentation.pptx
@@ -7221,7 +7221,7 @@
         <p:spPr>
           <a:xfrm>
             <a:off x="914400" y="4480560"/>
-            <a:ext cx="3474720" cy="411480"/>
+            <a:ext cx="2743200" cy="411480"/>
           </a:xfrm>
           <a:prstGeom prst="roundRect">
             <a:avLst/>
@@ -7252,7 +7252,7 @@
           <a:lstStyle/>
           <a:p>
             <a:pPr algn="ctr">
-              <a:defRPr sz="1200">
+              <a:defRPr sz="1300">
                 <a:solidFill>
                   <a:srgbClr val="FFFFFF"/>
                 </a:solidFill>
@@ -7260,7 +7260,7 @@
               </a:defRPr>
             </a:pPr>
             <a:r>
-              <a:t>Member 1  —  Role</a:t>
+              <a:t>Anh Bui</a:t>
             </a:r>
           </a:p>
         </p:txBody>
@@ -7273,8 +7273,8 @@
         </p:nvSpPr>
         <p:spPr>
           <a:xfrm>
-            <a:off x="5029200" y="4480560"/>
-            <a:ext cx="3474720" cy="411480"/>
+            <a:off x="4114800" y="4480560"/>
+            <a:ext cx="2743200" cy="411480"/>
           </a:xfrm>
           <a:prstGeom prst="roundRect">
             <a:avLst/>
@@ -7305,7 +7305,7 @@
           <a:lstStyle/>
           <a:p>
             <a:pPr algn="ctr">
-              <a:defRPr sz="1200">
+              <a:defRPr sz="1300">
                 <a:solidFill>
                   <a:srgbClr val="FFFFFF"/>
                 </a:solidFill>
@@ -7313,7 +7313,7 @@
               </a:defRPr>
             </a:pPr>
             <a:r>
-              <a:t>Member 2  —  Role</a:t>
+              <a:t>Cuong Nguyen</a:t>
             </a:r>
           </a:p>
         </p:txBody>
@@ -7326,8 +7326,8 @@
         </p:nvSpPr>
         <p:spPr>
           <a:xfrm>
-            <a:off x="914400" y="4983480"/>
-            <a:ext cx="3474720" cy="411480"/>
+            <a:off x="7315200" y="4480560"/>
+            <a:ext cx="2743200" cy="411480"/>
           </a:xfrm>
           <a:prstGeom prst="roundRect">
             <a:avLst/>
@@ -7358,7 +7358,7 @@
           <a:lstStyle/>
           <a:p>
             <a:pPr algn="ctr">
-              <a:defRPr sz="1200">
+              <a:defRPr sz="1300">
                 <a:solidFill>
                   <a:srgbClr val="FFFFFF"/>
                 </a:solidFill>
@@ -7366,67 +7366,14 @@
               </a:defRPr>
             </a:pPr>
             <a:r>
-              <a:t>Member 3  —  Role</a:t>
-            </a:r>
-          </a:p>
-        </p:txBody>
-      </p:sp>
-      <p:sp>
-        <p:nvSpPr>
-          <p:cNvPr id="13" name="Rounded Rectangle 12"/>
-          <p:cNvSpPr/>
-          <p:nvPr/>
-        </p:nvSpPr>
-        <p:spPr>
-          <a:xfrm>
-            <a:off x="5029200" y="4983480"/>
-            <a:ext cx="3474720" cy="411480"/>
-          </a:xfrm>
-          <a:prstGeom prst="roundRect">
-            <a:avLst/>
-          </a:prstGeom>
-          <a:solidFill>
-            <a:srgbClr val="5E9A66"/>
-          </a:solidFill>
-          <a:ln>
-            <a:noFill/>
-          </a:ln>
-        </p:spPr>
-        <p:style>
-          <a:lnRef idx="1">
-            <a:schemeClr val="accent1"/>
-          </a:lnRef>
-          <a:fillRef idx="3">
-            <a:schemeClr val="accent1"/>
-          </a:fillRef>
-          <a:effectRef idx="2">
-            <a:schemeClr val="accent1"/>
-          </a:effectRef>
-          <a:fontRef idx="minor">
-            <a:schemeClr val="lt1"/>
-          </a:fontRef>
-        </p:style>
-        <p:txBody>
-          <a:bodyPr rtlCol="0" anchor="ctr"/>
-          <a:lstStyle/>
-          <a:p>
-            <a:pPr algn="ctr">
-              <a:defRPr sz="1200">
-                <a:solidFill>
-                  <a:srgbClr val="FFFFFF"/>
-                </a:solidFill>
-                <a:latin typeface="Calibri"/>
-              </a:defRPr>
-            </a:pPr>
-            <a:r>
-              <a:t>Member 4  —  Role</a:t>
-            </a:r>
-          </a:p>
-        </p:txBody>
-      </p:sp>
-      <p:sp>
-        <p:nvSpPr>
-          <p:cNvPr id="14" name="TextBox 13"/>
+              <a:t>Minh Nguyen</a:t>
+            </a:r>
+          </a:p>
+        </p:txBody>
+      </p:sp>
+      <p:sp>
+        <p:nvSpPr>
+          <p:cNvPr id="13" name="TextBox 12"/>
           <p:cNvSpPr txBox="1"/>
           <p:nvPr/>
         </p:nvSpPr>
@@ -7462,7 +7409,7 @@
       </p:sp>
       <p:sp>
         <p:nvSpPr>
-          <p:cNvPr id="15" name="Rectangle 14"/>
+          <p:cNvPr id="14" name="Rectangle 13"/>
           <p:cNvSpPr/>
           <p:nvPr/>
         </p:nvSpPr>

</xml_diff>